<commit_message>
Minor bugs fixed. Add ttk wdgets
</commit_message>
<xml_diff>
--- a/readme.pptx
+++ b/readme.pptx
@@ -292,7 +292,7 @@
           <a:p>
             <a:fld id="{B4C71EC6-210F-42DE-9C53-41977AD35B3D}" type="datetimeFigureOut">
               <a:rPr lang="ru-RU" smtClean="0"/>
-              <a:t>15.01.2017</a:t>
+              <a:t>16.01.2017</a:t>
             </a:fld>
             <a:endParaRPr lang="ru-RU"/>
           </a:p>
@@ -457,7 +457,7 @@
           <a:p>
             <a:fld id="{B4C71EC6-210F-42DE-9C53-41977AD35B3D}" type="datetimeFigureOut">
               <a:rPr lang="ru-RU" smtClean="0"/>
-              <a:t>15.01.2017</a:t>
+              <a:t>16.01.2017</a:t>
             </a:fld>
             <a:endParaRPr lang="ru-RU"/>
           </a:p>
@@ -632,7 +632,7 @@
           <a:p>
             <a:fld id="{B4C71EC6-210F-42DE-9C53-41977AD35B3D}" type="datetimeFigureOut">
               <a:rPr lang="ru-RU" smtClean="0"/>
-              <a:t>15.01.2017</a:t>
+              <a:t>16.01.2017</a:t>
             </a:fld>
             <a:endParaRPr lang="ru-RU"/>
           </a:p>
@@ -797,7 +797,7 @@
           <a:p>
             <a:fld id="{B4C71EC6-210F-42DE-9C53-41977AD35B3D}" type="datetimeFigureOut">
               <a:rPr lang="ru-RU" smtClean="0"/>
-              <a:t>15.01.2017</a:t>
+              <a:t>16.01.2017</a:t>
             </a:fld>
             <a:endParaRPr lang="ru-RU"/>
           </a:p>
@@ -1038,7 +1038,7 @@
           <a:p>
             <a:fld id="{B4C71EC6-210F-42DE-9C53-41977AD35B3D}" type="datetimeFigureOut">
               <a:rPr lang="ru-RU" smtClean="0"/>
-              <a:t>15.01.2017</a:t>
+              <a:t>16.01.2017</a:t>
             </a:fld>
             <a:endParaRPr lang="ru-RU"/>
           </a:p>
@@ -1321,7 +1321,7 @@
           <a:p>
             <a:fld id="{B4C71EC6-210F-42DE-9C53-41977AD35B3D}" type="datetimeFigureOut">
               <a:rPr lang="ru-RU" smtClean="0"/>
-              <a:t>15.01.2017</a:t>
+              <a:t>16.01.2017</a:t>
             </a:fld>
             <a:endParaRPr lang="ru-RU"/>
           </a:p>
@@ -1738,7 +1738,7 @@
           <a:p>
             <a:fld id="{B4C71EC6-210F-42DE-9C53-41977AD35B3D}" type="datetimeFigureOut">
               <a:rPr lang="ru-RU" smtClean="0"/>
-              <a:t>15.01.2017</a:t>
+              <a:t>16.01.2017</a:t>
             </a:fld>
             <a:endParaRPr lang="ru-RU"/>
           </a:p>
@@ -1851,7 +1851,7 @@
           <a:p>
             <a:fld id="{B4C71EC6-210F-42DE-9C53-41977AD35B3D}" type="datetimeFigureOut">
               <a:rPr lang="ru-RU" smtClean="0"/>
-              <a:t>15.01.2017</a:t>
+              <a:t>16.01.2017</a:t>
             </a:fld>
             <a:endParaRPr lang="ru-RU"/>
           </a:p>
@@ -1941,7 +1941,7 @@
           <a:p>
             <a:fld id="{B4C71EC6-210F-42DE-9C53-41977AD35B3D}" type="datetimeFigureOut">
               <a:rPr lang="ru-RU" smtClean="0"/>
-              <a:t>15.01.2017</a:t>
+              <a:t>16.01.2017</a:t>
             </a:fld>
             <a:endParaRPr lang="ru-RU"/>
           </a:p>
@@ -2213,7 +2213,7 @@
           <a:p>
             <a:fld id="{B4C71EC6-210F-42DE-9C53-41977AD35B3D}" type="datetimeFigureOut">
               <a:rPr lang="ru-RU" smtClean="0"/>
-              <a:t>15.01.2017</a:t>
+              <a:t>16.01.2017</a:t>
             </a:fld>
             <a:endParaRPr lang="ru-RU"/>
           </a:p>
@@ -2461,7 +2461,7 @@
           <a:p>
             <a:fld id="{B4C71EC6-210F-42DE-9C53-41977AD35B3D}" type="datetimeFigureOut">
               <a:rPr lang="ru-RU" smtClean="0"/>
-              <a:t>15.01.2017</a:t>
+              <a:t>16.01.2017</a:t>
             </a:fld>
             <a:endParaRPr lang="ru-RU"/>
           </a:p>
@@ -2521,9 +2521,14 @@
 <p:sldMaster xmlns:a="http://schemas.openxmlformats.org/drawingml/2006/main" xmlns:r="http://schemas.openxmlformats.org/officeDocument/2006/relationships" xmlns:p="http://schemas.openxmlformats.org/presentationml/2006/main">
   <p:cSld>
     <p:bg>
-      <p:bgRef idx="1001">
-        <a:schemeClr val="bg1"/>
-      </p:bgRef>
+      <p:bgPr>
+        <a:blipFill dpi="0" rotWithShape="1">
+          <a:blip r:embed="rId13"/>
+          <a:srcRect/>
+          <a:tile tx="0" ty="0" sx="100000" sy="100000" flip="none" algn="tl"/>
+        </a:blipFill>
+        <a:effectLst/>
+      </p:bgPr>
     </p:bg>
     <p:spTree>
       <p:nvGrpSpPr>
@@ -2669,7 +2674,7 @@
           <a:p>
             <a:fld id="{B4C71EC6-210F-42DE-9C53-41977AD35B3D}" type="datetimeFigureOut">
               <a:rPr lang="ru-RU" smtClean="0"/>
-              <a:t>15.01.2017</a:t>
+              <a:t>16.01.2017</a:t>
             </a:fld>
             <a:endParaRPr lang="ru-RU"/>
           </a:p>
@@ -3287,8 +3292,8 @@
           <a:lstStyle/>
           <a:p>
             <a:r>
-              <a:rPr lang="en-US" dirty="0" smtClean="0"/>
-              <a:t>Python</a:t>
+              <a:rPr lang="en-US" smtClean="0"/>
+              <a:t>Python3</a:t>
             </a:r>
             <a:endParaRPr lang="ru-RU" dirty="0"/>
           </a:p>
@@ -4334,8 +4339,16 @@
               <a:t>numpy</a:t>
             </a:r>
             <a:r>
-              <a:rPr lang="en-US" smtClean="0"/>
+              <a:rPr lang="en-US" dirty="0" smtClean="0"/>
               <a:t>,</a:t>
+            </a:r>
+            <a:r>
+              <a:rPr lang="ru-RU" dirty="0" smtClean="0"/>
+              <a:t> </a:t>
+            </a:r>
+            <a:r>
+              <a:rPr lang="en-US" dirty="0" err="1" smtClean="0"/>
+              <a:t>mmtf</a:t>
             </a:r>
             <a:r>
               <a:rPr lang="en-US" dirty="0"/>

</xml_diff>

<commit_message>
Add tk version histo util. Minor bugs fixed
</commit_message>
<xml_diff>
--- a/readme.pptx
+++ b/readme.pptx
@@ -292,7 +292,7 @@
           <a:p>
             <a:fld id="{B4C71EC6-210F-42DE-9C53-41977AD35B3D}" type="datetimeFigureOut">
               <a:rPr lang="ru-RU" smtClean="0"/>
-              <a:t>16.01.2017</a:t>
+              <a:t>17.01.2017</a:t>
             </a:fld>
             <a:endParaRPr lang="ru-RU"/>
           </a:p>
@@ -457,7 +457,7 @@
           <a:p>
             <a:fld id="{B4C71EC6-210F-42DE-9C53-41977AD35B3D}" type="datetimeFigureOut">
               <a:rPr lang="ru-RU" smtClean="0"/>
-              <a:t>16.01.2017</a:t>
+              <a:t>17.01.2017</a:t>
             </a:fld>
             <a:endParaRPr lang="ru-RU"/>
           </a:p>
@@ -632,7 +632,7 @@
           <a:p>
             <a:fld id="{B4C71EC6-210F-42DE-9C53-41977AD35B3D}" type="datetimeFigureOut">
               <a:rPr lang="ru-RU" smtClean="0"/>
-              <a:t>16.01.2017</a:t>
+              <a:t>17.01.2017</a:t>
             </a:fld>
             <a:endParaRPr lang="ru-RU"/>
           </a:p>
@@ -797,7 +797,7 @@
           <a:p>
             <a:fld id="{B4C71EC6-210F-42DE-9C53-41977AD35B3D}" type="datetimeFigureOut">
               <a:rPr lang="ru-RU" smtClean="0"/>
-              <a:t>16.01.2017</a:t>
+              <a:t>17.01.2017</a:t>
             </a:fld>
             <a:endParaRPr lang="ru-RU"/>
           </a:p>
@@ -1038,7 +1038,7 @@
           <a:p>
             <a:fld id="{B4C71EC6-210F-42DE-9C53-41977AD35B3D}" type="datetimeFigureOut">
               <a:rPr lang="ru-RU" smtClean="0"/>
-              <a:t>16.01.2017</a:t>
+              <a:t>17.01.2017</a:t>
             </a:fld>
             <a:endParaRPr lang="ru-RU"/>
           </a:p>
@@ -1321,7 +1321,7 @@
           <a:p>
             <a:fld id="{B4C71EC6-210F-42DE-9C53-41977AD35B3D}" type="datetimeFigureOut">
               <a:rPr lang="ru-RU" smtClean="0"/>
-              <a:t>16.01.2017</a:t>
+              <a:t>17.01.2017</a:t>
             </a:fld>
             <a:endParaRPr lang="ru-RU"/>
           </a:p>
@@ -1738,7 +1738,7 @@
           <a:p>
             <a:fld id="{B4C71EC6-210F-42DE-9C53-41977AD35B3D}" type="datetimeFigureOut">
               <a:rPr lang="ru-RU" smtClean="0"/>
-              <a:t>16.01.2017</a:t>
+              <a:t>17.01.2017</a:t>
             </a:fld>
             <a:endParaRPr lang="ru-RU"/>
           </a:p>
@@ -1851,7 +1851,7 @@
           <a:p>
             <a:fld id="{B4C71EC6-210F-42DE-9C53-41977AD35B3D}" type="datetimeFigureOut">
               <a:rPr lang="ru-RU" smtClean="0"/>
-              <a:t>16.01.2017</a:t>
+              <a:t>17.01.2017</a:t>
             </a:fld>
             <a:endParaRPr lang="ru-RU"/>
           </a:p>
@@ -1941,7 +1941,7 @@
           <a:p>
             <a:fld id="{B4C71EC6-210F-42DE-9C53-41977AD35B3D}" type="datetimeFigureOut">
               <a:rPr lang="ru-RU" smtClean="0"/>
-              <a:t>16.01.2017</a:t>
+              <a:t>17.01.2017</a:t>
             </a:fld>
             <a:endParaRPr lang="ru-RU"/>
           </a:p>
@@ -2213,7 +2213,7 @@
           <a:p>
             <a:fld id="{B4C71EC6-210F-42DE-9C53-41977AD35B3D}" type="datetimeFigureOut">
               <a:rPr lang="ru-RU" smtClean="0"/>
-              <a:t>16.01.2017</a:t>
+              <a:t>17.01.2017</a:t>
             </a:fld>
             <a:endParaRPr lang="ru-RU"/>
           </a:p>
@@ -2461,7 +2461,7 @@
           <a:p>
             <a:fld id="{B4C71EC6-210F-42DE-9C53-41977AD35B3D}" type="datetimeFigureOut">
               <a:rPr lang="ru-RU" smtClean="0"/>
-              <a:t>16.01.2017</a:t>
+              <a:t>17.01.2017</a:t>
             </a:fld>
             <a:endParaRPr lang="ru-RU"/>
           </a:p>
@@ -2674,7 +2674,7 @@
           <a:p>
             <a:fld id="{B4C71EC6-210F-42DE-9C53-41977AD35B3D}" type="datetimeFigureOut">
               <a:rPr lang="ru-RU" smtClean="0"/>
-              <a:t>16.01.2017</a:t>
+              <a:t>17.01.2017</a:t>
             </a:fld>
             <a:endParaRPr lang="ru-RU"/>
           </a:p>
@@ -3497,7 +3497,7 @@
         </p:nvSpPr>
         <p:spPr>
           <a:xfrm>
-            <a:off x="467544" y="0"/>
+            <a:off x="467544" y="-171400"/>
             <a:ext cx="8229600" cy="1143000"/>
           </a:xfrm>
         </p:spPr>
@@ -3541,7 +3541,7 @@
         </p:nvSpPr>
         <p:spPr>
           <a:xfrm>
-            <a:off x="457200" y="908720"/>
+            <a:off x="467544" y="764704"/>
             <a:ext cx="8229600" cy="5616624"/>
           </a:xfrm>
         </p:spPr>
@@ -3696,7 +3696,7 @@
             </a:r>
             <a:r>
               <a:rPr lang="ru-RU" sz="1600" dirty="0" err="1" smtClean="0"/>
-              <a:t>пенумерация</a:t>
+              <a:t>перенумерация</a:t>
             </a:r>
             <a:r>
               <a:rPr lang="ru-RU" sz="1600" dirty="0" smtClean="0"/>
@@ -3830,12 +3830,47 @@
           </a:p>
           <a:p>
             <a:r>
+              <a:rPr lang="en-US" sz="1600" dirty="0" err="1"/>
+              <a:t>p</a:t>
+            </a:r>
+            <a:r>
+              <a:rPr lang="en-US" sz="1600" dirty="0" err="1" smtClean="0"/>
+              <a:t>isto_tk.pyw</a:t>
+            </a:r>
+            <a:r>
+              <a:rPr lang="ru-RU" sz="1600" dirty="0" smtClean="0"/>
+              <a:t>- </a:t>
+            </a:r>
+            <a:r>
+              <a:rPr lang="en-US" sz="1600" dirty="0" err="1"/>
+              <a:t>tk</a:t>
+            </a:r>
+            <a:r>
+              <a:rPr lang="en-US" sz="1600" dirty="0"/>
+              <a:t> </a:t>
+            </a:r>
+            <a:r>
+              <a:rPr lang="ru-RU" sz="1600" dirty="0" smtClean="0"/>
+              <a:t>версия</a:t>
+            </a:r>
+            <a:r>
+              <a:rPr lang="en-US" sz="1600" dirty="0" smtClean="0"/>
+              <a:t> histo.py</a:t>
+            </a:r>
+            <a:endParaRPr lang="en-US" sz="1600" dirty="0"/>
+          </a:p>
+          <a:p>
+            <a:r>
               <a:rPr lang="en-US" sz="1600" dirty="0" smtClean="0"/>
               <a:t>multigraph_umb.py</a:t>
             </a:r>
             <a:r>
               <a:rPr lang="ru-RU" sz="1600" dirty="0" smtClean="0"/>
-              <a:t> – </a:t>
+              <a:t> </a:t>
+            </a:r>
+            <a:r>
+              <a:rPr lang="ru-RU" sz="1600" dirty="0" smtClean="0"/>
+              <a:t>– </a:t>
             </a:r>
             <a:r>
               <a:rPr lang="ru-RU" sz="1600" dirty="0"/>

</xml_diff>